<commit_message>
Prototype and UI Design
Prototype and UI Design PDF Design By Mehedi Hasan using Proto.io
</commit_message>
<xml_diff>
--- a/Repeat-Exam-Form-Generator-Copy.pptx
+++ b/Repeat-Exam-Form-Generator-Copy.pptx
@@ -7680,13 +7680,8 @@
                     <a:p>
                       <a:r>
                         <a:rPr lang="en-US" dirty="0"/>
-                        <a:t>Report submission </a:t>
+                        <a:t>Report submission and Presentation</a:t>
                       </a:r>
-                      <a:r>
-                        <a:rPr lang="en-US"/>
-                        <a:t>and Presentation</a:t>
-                      </a:r>
-                      <a:endParaRPr lang="en-US" dirty="0"/>
                     </a:p>
                   </a:txBody>
                   <a:tcPr/>

</xml_diff>